<commit_message>
adjust the power point presentation
</commit_message>
<xml_diff>
--- a/CleanCodeProject/data/CleanCode.pptx
+++ b/CleanCodeProject/data/CleanCode.pptx
@@ -7,6 +7,8 @@
   <p:sldIdLst>
     <p:sldId id="256" r:id="rId2"/>
     <p:sldId id="257" r:id="rId3"/>
+    <p:sldId id="258" r:id="rId4"/>
+    <p:sldId id="259" r:id="rId5"/>
   </p:sldIdLst>
   <p:sldSz cx="12192000" cy="6858000"/>
   <p:notesSz cx="6858000" cy="9144000"/>
@@ -105,6 +107,11 @@
       </a:defRPr>
     </a:lvl9pPr>
   </p:defaultTextStyle>
+  <p:extLst>
+    <p:ext uri="{EFAFB233-063F-42B5-8137-9DF3F51BA10A}">
+      <p15:sldGuideLst xmlns:p15="http://schemas.microsoft.com/office/powerpoint/2012/main"/>
+    </p:ext>
+  </p:extLst>
 </p:presentation>
 </file>
 
@@ -239,7 +246,7 @@
           <a:p>
             <a:fld id="{A71895C7-E0BA-4AAB-A7FE-1C639DD40FB6}" type="datetimeFigureOut">
               <a:rPr lang="en-US" smtClean="0"/>
-              <a:t>11/1/2017</a:t>
+              <a:t>11/2/2017</a:t>
             </a:fld>
             <a:endParaRPr lang="en-US"/>
           </a:p>
@@ -409,7 +416,7 @@
           <a:p>
             <a:fld id="{A71895C7-E0BA-4AAB-A7FE-1C639DD40FB6}" type="datetimeFigureOut">
               <a:rPr lang="en-US" smtClean="0"/>
-              <a:t>11/1/2017</a:t>
+              <a:t>11/2/2017</a:t>
             </a:fld>
             <a:endParaRPr lang="en-US"/>
           </a:p>
@@ -589,7 +596,7 @@
           <a:p>
             <a:fld id="{A71895C7-E0BA-4AAB-A7FE-1C639DD40FB6}" type="datetimeFigureOut">
               <a:rPr lang="en-US" smtClean="0"/>
-              <a:t>11/1/2017</a:t>
+              <a:t>11/2/2017</a:t>
             </a:fld>
             <a:endParaRPr lang="en-US"/>
           </a:p>
@@ -759,7 +766,7 @@
           <a:p>
             <a:fld id="{A71895C7-E0BA-4AAB-A7FE-1C639DD40FB6}" type="datetimeFigureOut">
               <a:rPr lang="en-US" smtClean="0"/>
-              <a:t>11/1/2017</a:t>
+              <a:t>11/2/2017</a:t>
             </a:fld>
             <a:endParaRPr lang="en-US"/>
           </a:p>
@@ -1005,7 +1012,7 @@
           <a:p>
             <a:fld id="{A71895C7-E0BA-4AAB-A7FE-1C639DD40FB6}" type="datetimeFigureOut">
               <a:rPr lang="en-US" smtClean="0"/>
-              <a:t>11/1/2017</a:t>
+              <a:t>11/2/2017</a:t>
             </a:fld>
             <a:endParaRPr lang="en-US"/>
           </a:p>
@@ -1237,7 +1244,7 @@
           <a:p>
             <a:fld id="{A71895C7-E0BA-4AAB-A7FE-1C639DD40FB6}" type="datetimeFigureOut">
               <a:rPr lang="en-US" smtClean="0"/>
-              <a:t>11/1/2017</a:t>
+              <a:t>11/2/2017</a:t>
             </a:fld>
             <a:endParaRPr lang="en-US"/>
           </a:p>
@@ -1604,7 +1611,7 @@
           <a:p>
             <a:fld id="{A71895C7-E0BA-4AAB-A7FE-1C639DD40FB6}" type="datetimeFigureOut">
               <a:rPr lang="en-US" smtClean="0"/>
-              <a:t>11/1/2017</a:t>
+              <a:t>11/2/2017</a:t>
             </a:fld>
             <a:endParaRPr lang="en-US"/>
           </a:p>
@@ -1722,7 +1729,7 @@
           <a:p>
             <a:fld id="{A71895C7-E0BA-4AAB-A7FE-1C639DD40FB6}" type="datetimeFigureOut">
               <a:rPr lang="en-US" smtClean="0"/>
-              <a:t>11/1/2017</a:t>
+              <a:t>11/2/2017</a:t>
             </a:fld>
             <a:endParaRPr lang="en-US"/>
           </a:p>
@@ -1817,7 +1824,7 @@
           <a:p>
             <a:fld id="{A71895C7-E0BA-4AAB-A7FE-1C639DD40FB6}" type="datetimeFigureOut">
               <a:rPr lang="en-US" smtClean="0"/>
-              <a:t>11/1/2017</a:t>
+              <a:t>11/2/2017</a:t>
             </a:fld>
             <a:endParaRPr lang="en-US"/>
           </a:p>
@@ -2094,7 +2101,7 @@
           <a:p>
             <a:fld id="{A71895C7-E0BA-4AAB-A7FE-1C639DD40FB6}" type="datetimeFigureOut">
               <a:rPr lang="en-US" smtClean="0"/>
-              <a:t>11/1/2017</a:t>
+              <a:t>11/2/2017</a:t>
             </a:fld>
             <a:endParaRPr lang="en-US"/>
           </a:p>
@@ -2347,7 +2354,7 @@
           <a:p>
             <a:fld id="{A71895C7-E0BA-4AAB-A7FE-1C639DD40FB6}" type="datetimeFigureOut">
               <a:rPr lang="en-US" smtClean="0"/>
-              <a:t>11/1/2017</a:t>
+              <a:t>11/2/2017</a:t>
             </a:fld>
             <a:endParaRPr lang="en-US"/>
           </a:p>
@@ -2560,7 +2567,7 @@
           <a:p>
             <a:fld id="{A71895C7-E0BA-4AAB-A7FE-1C639DD40FB6}" type="datetimeFigureOut">
               <a:rPr lang="en-US" smtClean="0"/>
-              <a:t>11/1/2017</a:t>
+              <a:t>11/2/2017</a:t>
             </a:fld>
             <a:endParaRPr lang="en-US"/>
           </a:p>
@@ -3084,7 +3091,9 @@
         </p:nvSpPr>
         <p:spPr/>
         <p:txBody>
-          <a:bodyPr/>
+          <a:bodyPr>
+            <a:normAutofit lnSpcReduction="10000"/>
+          </a:bodyPr>
           <a:lstStyle/>
           <a:p>
             <a:r>
@@ -3093,9 +3102,18 @@
             </a:r>
           </a:p>
           <a:p>
+            <a:pPr algn="just"/>
             <a:r>
               <a:rPr lang="es-419" dirty="0" smtClean="0"/>
-              <a:t>Evitar la desinformación: ejemplo variables llamadas: l, hp, </a:t>
+              <a:t>Evitar la </a:t>
+            </a:r>
+            <a:r>
+              <a:rPr lang="es-419" dirty="0" smtClean="0"/>
+              <a:t>desinformación y mapeos mentales: </a:t>
+            </a:r>
+            <a:r>
+              <a:rPr lang="es-419" dirty="0" smtClean="0"/>
+              <a:t>ejemplo variables llamadas: l, hp, </a:t>
             </a:r>
             <a:r>
               <a:rPr lang="es-419" dirty="0" err="1" smtClean="0"/>
@@ -3114,8 +3132,56 @@
           <a:p>
             <a:r>
               <a:rPr lang="es-419" dirty="0" smtClean="0"/>
-              <a:t>Evitar usar el mismo nombre de variable para varios fines</a:t>
-            </a:r>
+              <a:t>Evitar usar el mismo nombre de variable para varios </a:t>
+            </a:r>
+            <a:r>
+              <a:rPr lang="es-419" dirty="0" smtClean="0"/>
+              <a:t>fines</a:t>
+            </a:r>
+          </a:p>
+          <a:p>
+            <a:r>
+              <a:rPr lang="es-419" dirty="0" smtClean="0"/>
+              <a:t>Usar nombres que sean pronunciables</a:t>
+            </a:r>
+          </a:p>
+          <a:p>
+            <a:r>
+              <a:rPr lang="es-419" dirty="0" smtClean="0"/>
+              <a:t>Usar nombres que puedan ser buscados fácilmente: es mas fácil buscar “ESTA_CADENA” a buscar “e”</a:t>
+            </a:r>
+          </a:p>
+          <a:p>
+            <a:r>
+              <a:rPr lang="es-419" dirty="0" smtClean="0"/>
+              <a:t>No es necesario los prefijos: </a:t>
+            </a:r>
+            <a:r>
+              <a:rPr lang="es-419" dirty="0" err="1" smtClean="0"/>
+              <a:t>string_nombreCliente</a:t>
+            </a:r>
+            <a:endParaRPr lang="es-419" dirty="0" smtClean="0"/>
+          </a:p>
+          <a:p>
+            <a:r>
+              <a:rPr lang="es-419" dirty="0" smtClean="0"/>
+              <a:t>Nombramiento de las interfaces con la letra “I”: </a:t>
+            </a:r>
+            <a:r>
+              <a:rPr lang="es-419" dirty="0" err="1" smtClean="0"/>
+              <a:t>ICliente</a:t>
+            </a:r>
+            <a:r>
+              <a:rPr lang="es-419" dirty="0" smtClean="0"/>
+              <a:t>, mejor Cliente y la implementación es </a:t>
+            </a:r>
+            <a:r>
+              <a:rPr lang="es-419" dirty="0" err="1" smtClean="0"/>
+              <a:t>ClienteImpl</a:t>
+            </a:r>
+            <a:endParaRPr lang="es-419" dirty="0" smtClean="0"/>
+          </a:p>
+          <a:p>
             <a:endParaRPr lang="en-US" dirty="0"/>
           </a:p>
         </p:txBody>
@@ -3124,6 +3190,205 @@
     <p:extLst>
       <p:ext uri="{BB962C8B-B14F-4D97-AF65-F5344CB8AC3E}">
         <p14:creationId xmlns:p14="http://schemas.microsoft.com/office/powerpoint/2010/main" val="2703578861"/>
+      </p:ext>
+    </p:extLst>
+  </p:cSld>
+  <p:clrMapOvr>
+    <a:masterClrMapping/>
+  </p:clrMapOvr>
+</p:sld>
+</file>
+
+<file path=ppt/slides/slide3.xml><?xml version="1.0" encoding="utf-8"?>
+<p:sld xmlns:a="http://schemas.openxmlformats.org/drawingml/2006/main" xmlns:r="http://schemas.openxmlformats.org/officeDocument/2006/relationships" xmlns:p="http://schemas.openxmlformats.org/presentationml/2006/main">
+  <p:cSld>
+    <p:spTree>
+      <p:nvGrpSpPr>
+        <p:cNvPr id="1" name=""/>
+        <p:cNvGrpSpPr/>
+        <p:nvPr/>
+      </p:nvGrpSpPr>
+      <p:grpSpPr>
+        <a:xfrm>
+          <a:off x="0" y="0"/>
+          <a:ext cx="0" cy="0"/>
+          <a:chOff x="0" y="0"/>
+          <a:chExt cx="0" cy="0"/>
+        </a:xfrm>
+      </p:grpSpPr>
+      <p:sp>
+        <p:nvSpPr>
+          <p:cNvPr id="2" name="Title 1"/>
+          <p:cNvSpPr>
+            <a:spLocks noGrp="1"/>
+          </p:cNvSpPr>
+          <p:nvPr>
+            <p:ph type="title"/>
+          </p:nvPr>
+        </p:nvSpPr>
+        <p:spPr/>
+        <p:txBody>
+          <a:bodyPr/>
+          <a:lstStyle/>
+          <a:p>
+            <a:r>
+              <a:rPr lang="es-419" dirty="0" smtClean="0"/>
+              <a:t>Nombres significativos</a:t>
+            </a:r>
+            <a:endParaRPr lang="en-US" dirty="0"/>
+          </a:p>
+        </p:txBody>
+      </p:sp>
+      <p:sp>
+        <p:nvSpPr>
+          <p:cNvPr id="3" name="Content Placeholder 2"/>
+          <p:cNvSpPr>
+            <a:spLocks noGrp="1"/>
+          </p:cNvSpPr>
+          <p:nvPr>
+            <p:ph idx="1"/>
+          </p:nvPr>
+        </p:nvSpPr>
+        <p:spPr/>
+        <p:txBody>
+          <a:bodyPr/>
+          <a:lstStyle/>
+          <a:p>
+            <a:r>
+              <a:rPr lang="es-419" dirty="0" smtClean="0"/>
+              <a:t>Evitar los verbos en los nombres de las clases: ejemplos: Procesar, Manejar.</a:t>
+            </a:r>
+          </a:p>
+          <a:p>
+            <a:r>
+              <a:rPr lang="es-419" dirty="0" smtClean="0"/>
+              <a:t>Los métodos si deben tener acción verbal y los </a:t>
+            </a:r>
+            <a:r>
+              <a:rPr lang="es-419" dirty="0" err="1" smtClean="0"/>
+              <a:t>accesores</a:t>
+            </a:r>
+            <a:r>
+              <a:rPr lang="es-419" dirty="0" smtClean="0"/>
+              <a:t> definirse con prefijo “</a:t>
+            </a:r>
+            <a:r>
+              <a:rPr lang="es-419" dirty="0" err="1" smtClean="0"/>
+              <a:t>get</a:t>
+            </a:r>
+            <a:r>
+              <a:rPr lang="es-419" dirty="0" smtClean="0"/>
+              <a:t> - set” si es en ingles, o “dar - cambiar” si es en español.</a:t>
+            </a:r>
+          </a:p>
+          <a:p>
+            <a:r>
+              <a:rPr lang="es-419" dirty="0" smtClean="0"/>
+              <a:t>Evitar sentimentalismos: ejemplo método “estampillarse” a cambio de “</a:t>
+            </a:r>
+            <a:r>
+              <a:rPr lang="es-419" dirty="0" err="1" smtClean="0"/>
+              <a:t>generarExcepciónPorErrorDatoNoEncontrado</a:t>
+            </a:r>
+            <a:r>
+              <a:rPr lang="es-419" dirty="0" smtClean="0"/>
+              <a:t>”</a:t>
+            </a:r>
+          </a:p>
+          <a:p>
+            <a:endParaRPr lang="es-419" dirty="0" smtClean="0"/>
+          </a:p>
+          <a:p>
+            <a:endParaRPr lang="en-US" dirty="0"/>
+          </a:p>
+        </p:txBody>
+      </p:sp>
+    </p:spTree>
+    <p:extLst>
+      <p:ext uri="{BB962C8B-B14F-4D97-AF65-F5344CB8AC3E}">
+        <p14:creationId xmlns:p14="http://schemas.microsoft.com/office/powerpoint/2010/main" val="4127179175"/>
+      </p:ext>
+    </p:extLst>
+  </p:cSld>
+  <p:clrMapOvr>
+    <a:masterClrMapping/>
+  </p:clrMapOvr>
+</p:sld>
+</file>
+
+<file path=ppt/slides/slide4.xml><?xml version="1.0" encoding="utf-8"?>
+<p:sld xmlns:a="http://schemas.openxmlformats.org/drawingml/2006/main" xmlns:r="http://schemas.openxmlformats.org/officeDocument/2006/relationships" xmlns:p="http://schemas.openxmlformats.org/presentationml/2006/main">
+  <p:cSld>
+    <p:spTree>
+      <p:nvGrpSpPr>
+        <p:cNvPr id="1" name=""/>
+        <p:cNvGrpSpPr/>
+        <p:nvPr/>
+      </p:nvGrpSpPr>
+      <p:grpSpPr>
+        <a:xfrm>
+          <a:off x="0" y="0"/>
+          <a:ext cx="0" cy="0"/>
+          <a:chOff x="0" y="0"/>
+          <a:chExt cx="0" cy="0"/>
+        </a:xfrm>
+      </p:grpSpPr>
+      <p:sp>
+        <p:nvSpPr>
+          <p:cNvPr id="2" name="Title 1"/>
+          <p:cNvSpPr>
+            <a:spLocks noGrp="1"/>
+          </p:cNvSpPr>
+          <p:nvPr>
+            <p:ph type="title"/>
+          </p:nvPr>
+        </p:nvSpPr>
+        <p:spPr/>
+        <p:txBody>
+          <a:bodyPr/>
+          <a:lstStyle/>
+          <a:p>
+            <a:r>
+              <a:rPr lang="es-419" dirty="0" smtClean="0"/>
+              <a:t>Funciones</a:t>
+            </a:r>
+            <a:endParaRPr lang="en-US" dirty="0"/>
+          </a:p>
+        </p:txBody>
+      </p:sp>
+      <p:sp>
+        <p:nvSpPr>
+          <p:cNvPr id="3" name="Content Placeholder 2"/>
+          <p:cNvSpPr>
+            <a:spLocks noGrp="1"/>
+          </p:cNvSpPr>
+          <p:nvPr>
+            <p:ph idx="1"/>
+          </p:nvPr>
+        </p:nvSpPr>
+        <p:spPr/>
+        <p:txBody>
+          <a:bodyPr/>
+          <a:lstStyle/>
+          <a:p>
+            <a:r>
+              <a:rPr lang="es-419" dirty="0" smtClean="0"/>
+              <a:t>Deben </a:t>
+            </a:r>
+            <a:r>
+              <a:rPr lang="es-419" smtClean="0"/>
+              <a:t>ser pequeñas</a:t>
+            </a:r>
+          </a:p>
+          <a:p>
+            <a:endParaRPr lang="en-US" dirty="0"/>
+          </a:p>
+        </p:txBody>
+      </p:sp>
+    </p:spTree>
+    <p:extLst>
+      <p:ext uri="{BB962C8B-B14F-4D97-AF65-F5344CB8AC3E}">
+        <p14:creationId xmlns:p14="http://schemas.microsoft.com/office/powerpoint/2010/main" val="1183475364"/>
       </p:ext>
     </p:extLst>
   </p:cSld>

</xml_diff>